<commit_message>
Finalized Slides May 3
</commit_message>
<xml_diff>
--- a/LetsGo.pptx
+++ b/LetsGo.pptx
@@ -13,15 +13,14 @@
     <p:sldId id="262" r:id="rId7"/>
     <p:sldId id="263" r:id="rId8"/>
     <p:sldId id="264" r:id="rId9"/>
-    <p:sldId id="275" r:id="rId10"/>
-    <p:sldId id="265" r:id="rId11"/>
-    <p:sldId id="266" r:id="rId12"/>
-    <p:sldId id="271" r:id="rId13"/>
-    <p:sldId id="270" r:id="rId14"/>
-    <p:sldId id="272" r:id="rId15"/>
-    <p:sldId id="260" r:id="rId16"/>
-    <p:sldId id="273" r:id="rId17"/>
-    <p:sldId id="261" r:id="rId18"/>
+    <p:sldId id="265" r:id="rId10"/>
+    <p:sldId id="266" r:id="rId11"/>
+    <p:sldId id="271" r:id="rId12"/>
+    <p:sldId id="270" r:id="rId13"/>
+    <p:sldId id="272" r:id="rId14"/>
+    <p:sldId id="260" r:id="rId15"/>
+    <p:sldId id="273" r:id="rId16"/>
+    <p:sldId id="261" r:id="rId17"/>
   </p:sldIdLst>
   <p:sldSz cx="12192000" cy="6858000"/>
   <p:notesSz cx="6858000" cy="9144000"/>
@@ -3466,38 +3465,6 @@
           </a:p>
         </p:txBody>
       </p:sp>
-      <p:pic>
-        <p:nvPicPr>
-          <p:cNvPr id="7" name="Picture Placeholder 6"/>
-          <p:cNvPicPr>
-            <a:picLocks noGrp="1" noChangeAspect="1"/>
-          </p:cNvPicPr>
-          <p:nvPr>
-            <p:ph type="pic" idx="1"/>
-          </p:nvPr>
-        </p:nvPicPr>
-        <p:blipFill rotWithShape="1">
-          <a:blip r:embed="rId2">
-            <a:extLst>
-              <a:ext uri="{28A0092B-C50C-407E-A947-70E740481C1C}">
-                <a14:useLocalDpi xmlns:a14="http://schemas.microsoft.com/office/drawing/2010/main" val="0"/>
-              </a:ext>
-            </a:extLst>
-          </a:blip>
-          <a:srcRect l="15005" r="16920"/>
-          <a:stretch/>
-        </p:blipFill>
-        <p:spPr>
-          <a:xfrm>
-            <a:off x="174271" y="2700337"/>
-            <a:ext cx="2054580" cy="1764029"/>
-          </a:xfrm>
-          <a:prstGeom prst="rect">
-            <a:avLst/>
-          </a:prstGeom>
-          <a:effectLst/>
-        </p:spPr>
-      </p:pic>
       <p:sp>
         <p:nvSpPr>
           <p:cNvPr id="2" name="Title 1"/>
@@ -3510,7 +3477,7 @@
         </p:nvSpPr>
         <p:spPr>
           <a:xfrm>
-            <a:off x="1349016" y="-100118"/>
+            <a:off x="501075" y="0"/>
             <a:ext cx="3667039" cy="1676603"/>
           </a:xfrm>
         </p:spPr>
@@ -3520,6 +3487,7 @@
           </a:bodyPr>
           <a:lstStyle/>
           <a:p>
+            <a:pPr algn="ctr"/>
             <a:r>
               <a:rPr lang="en-US" sz="3600" b="1" dirty="0">
                 <a:solidFill>
@@ -3527,7 +3495,7 @@
                 </a:solidFill>
                 <a:latin typeface="Garamond" panose="02020404030301010803" pitchFamily="18" charset="0"/>
               </a:rPr>
-              <a:t>Testing</a:t>
+              <a:t>Auto-Documenter</a:t>
             </a:r>
           </a:p>
         </p:txBody>
@@ -3544,7 +3512,7 @@
         </p:nvSpPr>
         <p:spPr>
           <a:xfrm>
-            <a:off x="484486" y="4464366"/>
+            <a:off x="484486" y="4658634"/>
             <a:ext cx="3667036" cy="3779520"/>
           </a:xfrm>
         </p:spPr>
@@ -3576,7 +3544,7 @@
                 <a:latin typeface="Batang" panose="02030600000101010101" pitchFamily="18" charset="-127"/>
                 <a:ea typeface="Batang" panose="02030600000101010101" pitchFamily="18" charset="-127"/>
               </a:rPr>
-              <a:t>Used these frameworks to develop unit tests for the code</a:t>
+              <a:t>To gather all comments and summaries of code</a:t>
             </a:r>
           </a:p>
           <a:p>
@@ -3586,24 +3554,24 @@
                 <a:solidFill>
                   <a:srgbClr val="FF0000"/>
                 </a:solidFill>
-                <a:latin typeface="Garamond" panose="02020404030301010803" pitchFamily="18" charset="0"/>
+                <a:latin typeface="Batang" panose="02030600000101010101" pitchFamily="18" charset="-127"/>
                 <a:ea typeface="Batang" panose="02030600000101010101" pitchFamily="18" charset="-127"/>
               </a:rPr>
-              <a:t>5</a:t>
+              <a:t>4</a:t>
             </a:r>
           </a:p>
         </p:txBody>
       </p:sp>
       <p:pic>
         <p:nvPicPr>
-          <p:cNvPr id="9" name="Picture 8"/>
+          <p:cNvPr id="3" name="Picture 2"/>
           <p:cNvPicPr>
             <a:picLocks noChangeAspect="1"/>
           </p:cNvPicPr>
           <p:nvPr/>
         </p:nvPicPr>
         <p:blipFill>
-          <a:blip r:embed="rId3">
+          <a:blip r:embed="rId2">
             <a:extLst>
               <a:ext uri="{28A0092B-C50C-407E-A947-70E740481C1C}">
                 <a14:useLocalDpi xmlns:a14="http://schemas.microsoft.com/office/drawing/2010/main" val="0"/>
@@ -3616,8 +3584,8 @@
         </p:blipFill>
         <p:spPr>
           <a:xfrm>
-            <a:off x="4673042" y="571101"/>
-            <a:ext cx="7087589" cy="5715798"/>
+            <a:off x="4708262" y="1123628"/>
+            <a:ext cx="7411484" cy="4610743"/>
           </a:xfrm>
           <a:prstGeom prst="rect">
             <a:avLst/>
@@ -3626,14 +3594,14 @@
       </p:pic>
       <p:pic>
         <p:nvPicPr>
-          <p:cNvPr id="1026" name="Picture 2" descr="https://avatars1.githubusercontent.com/u/874086?v=3&amp;s=400"/>
+          <p:cNvPr id="4100" name="Picture 4" descr="Image result for java png"/>
           <p:cNvPicPr>
             <a:picLocks noChangeAspect="1" noChangeArrowheads="1"/>
           </p:cNvPicPr>
           <p:nvPr/>
         </p:nvPicPr>
         <p:blipFill>
-          <a:blip r:embed="rId4">
+          <a:blip r:embed="rId3">
             <a:extLst>
               <a:ext uri="{28A0092B-C50C-407E-A947-70E740481C1C}">
                 <a14:useLocalDpi xmlns:a14="http://schemas.microsoft.com/office/drawing/2010/main" val="0"/>
@@ -3647,8 +3615,8 @@
         </p:blipFill>
         <p:spPr bwMode="auto">
           <a:xfrm>
-            <a:off x="2185898" y="907807"/>
-            <a:ext cx="2274297" cy="2337667"/>
+            <a:off x="1443324" y="1308506"/>
+            <a:ext cx="1782539" cy="3251137"/>
           </a:xfrm>
           <a:prstGeom prst="rect">
             <a:avLst/>
@@ -3668,7 +3636,7 @@
     </p:spTree>
     <p:extLst>
       <p:ext uri="{BB962C8B-B14F-4D97-AF65-F5344CB8AC3E}">
-        <p14:creationId xmlns:p14="http://schemas.microsoft.com/office/powerpoint/2010/main" val="540850777"/>
+        <p14:creationId xmlns:p14="http://schemas.microsoft.com/office/powerpoint/2010/main" val="256193105"/>
       </p:ext>
     </p:extLst>
   </p:cSld>
@@ -3817,7 +3785,7 @@
                 </a:solidFill>
                 <a:latin typeface="Garamond" panose="02020404030301010803" pitchFamily="18" charset="0"/>
               </a:rPr>
-              <a:t>Auto-Documenter</a:t>
+              <a:t>Deployment Environment</a:t>
             </a:r>
           </a:p>
         </p:txBody>
@@ -3834,7 +3802,7 @@
         </p:nvSpPr>
         <p:spPr>
           <a:xfrm>
-            <a:off x="484486" y="4782202"/>
+            <a:off x="484486" y="4614962"/>
             <a:ext cx="3667036" cy="3779520"/>
           </a:xfrm>
         </p:spPr>
@@ -3853,7 +3821,20 @@
                 <a:latin typeface="Batang" panose="02030600000101010101" pitchFamily="18" charset="-127"/>
                 <a:ea typeface="Batang" panose="02030600000101010101" pitchFamily="18" charset="-127"/>
               </a:rPr>
-              <a:t>Purpose: To gather all comments and summaries of code</a:t>
+              <a:t>Purpose: </a:t>
+            </a:r>
+          </a:p>
+          <a:p>
+            <a:pPr algn="ctr"/>
+            <a:r>
+              <a:rPr lang="en-US" sz="2400" dirty="0">
+                <a:solidFill>
+                  <a:schemeClr val="bg1"/>
+                </a:solidFill>
+                <a:latin typeface="Batang" panose="02030600000101010101" pitchFamily="18" charset="-127"/>
+                <a:ea typeface="Batang" panose="02030600000101010101" pitchFamily="18" charset="-127"/>
+              </a:rPr>
+              <a:t>To test and run the app</a:t>
             </a:r>
           </a:p>
           <a:p>
@@ -3873,11 +3854,13 @@
       </p:sp>
       <p:pic>
         <p:nvPicPr>
-          <p:cNvPr id="3" name="Picture 2"/>
+          <p:cNvPr id="7" name="Picture Placeholder 6"/>
           <p:cNvPicPr>
-            <a:picLocks noChangeAspect="1"/>
+            <a:picLocks noGrp="1" noChangeAspect="1"/>
           </p:cNvPicPr>
-          <p:nvPr/>
+          <p:nvPr>
+            <p:ph type="pic" idx="1"/>
+          </p:nvPr>
         </p:nvPicPr>
         <p:blipFill>
           <a:blip r:embed="rId2">
@@ -3887,25 +3870,23 @@
               </a:ext>
             </a:extLst>
           </a:blip>
+          <a:srcRect l="2075" r="2075"/>
           <a:stretch>
             <a:fillRect/>
           </a:stretch>
         </p:blipFill>
         <p:spPr>
           <a:xfrm>
-            <a:off x="4708262" y="1123628"/>
-            <a:ext cx="7411484" cy="4610743"/>
-          </a:xfrm>
-          <a:prstGeom prst="rect">
-            <a:avLst/>
-          </a:prstGeom>
+            <a:off x="818233" y="1800170"/>
+            <a:ext cx="3032722" cy="2352004"/>
+          </a:xfrm>
         </p:spPr>
       </p:pic>
       <p:pic>
         <p:nvPicPr>
-          <p:cNvPr id="4100" name="Picture 4" descr="Image result for java png"/>
+          <p:cNvPr id="9" name="Picture 8"/>
           <p:cNvPicPr>
-            <a:picLocks noChangeAspect="1" noChangeArrowheads="1"/>
+            <a:picLocks noChangeAspect="1"/>
           </p:cNvPicPr>
           <p:nvPr/>
         </p:nvPicPr>
@@ -3917,35 +3898,24 @@
               </a:ext>
             </a:extLst>
           </a:blip>
-          <a:srcRect/>
           <a:stretch>
             <a:fillRect/>
           </a:stretch>
         </p:blipFill>
-        <p:spPr bwMode="auto">
-          <a:xfrm>
-            <a:off x="1443324" y="1308506"/>
-            <a:ext cx="1782539" cy="3251137"/>
+        <p:spPr>
+          <a:xfrm>
+            <a:off x="6485191" y="176639"/>
+            <a:ext cx="3857625" cy="6504722"/>
           </a:xfrm>
           <a:prstGeom prst="rect">
             <a:avLst/>
           </a:prstGeom>
-          <a:noFill/>
-          <a:extLst>
-            <a:ext uri="{909E8E84-426E-40DD-AFC4-6F175D3DCCD1}">
-              <a14:hiddenFill xmlns:a14="http://schemas.microsoft.com/office/drawing/2010/main">
-                <a:solidFill>
-                  <a:srgbClr val="FFFFFF"/>
-                </a:solidFill>
-              </a14:hiddenFill>
-            </a:ext>
-          </a:extLst>
         </p:spPr>
       </p:pic>
     </p:spTree>
     <p:extLst>
       <p:ext uri="{BB962C8B-B14F-4D97-AF65-F5344CB8AC3E}">
-        <p14:creationId xmlns:p14="http://schemas.microsoft.com/office/powerpoint/2010/main" val="256193105"/>
+        <p14:creationId xmlns:p14="http://schemas.microsoft.com/office/powerpoint/2010/main" val="1803584850"/>
       </p:ext>
     </p:extLst>
   </p:cSld>
@@ -4094,7 +4064,7 @@
                 </a:solidFill>
                 <a:latin typeface="Garamond" panose="02020404030301010803" pitchFamily="18" charset="0"/>
               </a:rPr>
-              <a:t>Deployment Environment</a:t>
+              <a:t>Framework</a:t>
             </a:r>
           </a:p>
         </p:txBody>
@@ -4111,7 +4081,7 @@
         </p:nvSpPr>
         <p:spPr>
           <a:xfrm>
-            <a:off x="484486" y="4614962"/>
+            <a:off x="501075" y="4404897"/>
             <a:ext cx="3667036" cy="3779520"/>
           </a:xfrm>
         </p:spPr>
@@ -4130,7 +4100,20 @@
                 <a:latin typeface="Batang" panose="02030600000101010101" pitchFamily="18" charset="-127"/>
                 <a:ea typeface="Batang" panose="02030600000101010101" pitchFamily="18" charset="-127"/>
               </a:rPr>
-              <a:t>Purpose: To test and run the app</a:t>
+              <a:t>Purpose: </a:t>
+            </a:r>
+          </a:p>
+          <a:p>
+            <a:pPr algn="ctr"/>
+            <a:r>
+              <a:rPr lang="en-US" sz="2400" dirty="0">
+                <a:solidFill>
+                  <a:schemeClr val="bg1"/>
+                </a:solidFill>
+                <a:latin typeface="Batang" panose="02030600000101010101" pitchFamily="18" charset="-127"/>
+                <a:ea typeface="Batang" panose="02030600000101010101" pitchFamily="18" charset="-127"/>
+              </a:rPr>
+              <a:t>We used this to develop the code needed for the app</a:t>
             </a:r>
           </a:p>
           <a:p>
@@ -4140,17 +4123,17 @@
                 <a:solidFill>
                   <a:srgbClr val="FF0000"/>
                 </a:solidFill>
-                <a:latin typeface="Batang" panose="02030600000101010101" pitchFamily="18" charset="-127"/>
+                <a:latin typeface="Garamond" panose="02020404030301010803" pitchFamily="18" charset="0"/>
                 <a:ea typeface="Batang" panose="02030600000101010101" pitchFamily="18" charset="-127"/>
               </a:rPr>
-              <a:t>4</a:t>
+              <a:t>3</a:t>
             </a:r>
           </a:p>
         </p:txBody>
       </p:sp>
       <p:pic>
         <p:nvPicPr>
-          <p:cNvPr id="9" name="Picture 8"/>
+          <p:cNvPr id="6" name="Picture 5"/>
           <p:cNvPicPr>
             <a:picLocks noChangeAspect="1"/>
           </p:cNvPicPr>
@@ -4170,8 +4153,8 @@
         </p:blipFill>
         <p:spPr>
           <a:xfrm>
-            <a:off x="6485191" y="176639"/>
-            <a:ext cx="3857625" cy="6504722"/>
+            <a:off x="4786313" y="667629"/>
+            <a:ext cx="7300912" cy="5204534"/>
           </a:xfrm>
           <a:prstGeom prst="rect">
             <a:avLst/>
@@ -4180,7 +4163,7 @@
       </p:pic>
       <p:pic>
         <p:nvPicPr>
-          <p:cNvPr id="2050" name="Picture 2" descr="Image result for android png"/>
+          <p:cNvPr id="3074" name="Picture 2" descr="https://3.bp.blogspot.com/-DPRLHrqBbvU/VtCdm79QAdI/AAAAAAAAAko/576y8WmN8xM/s1600/lll.png"/>
           <p:cNvPicPr>
             <a:picLocks noChangeAspect="1" noChangeArrowheads="1"/>
           </p:cNvPicPr>
@@ -4188,13 +4171,6 @@
         </p:nvPicPr>
         <p:blipFill>
           <a:blip r:embed="rId3">
-            <a:duotone>
-              <a:schemeClr val="bg2">
-                <a:shade val="45000"/>
-                <a:satMod val="135000"/>
-              </a:schemeClr>
-              <a:prstClr val="white"/>
-            </a:duotone>
             <a:extLst>
               <a:ext uri="{28A0092B-C50C-407E-A947-70E740481C1C}">
                 <a14:useLocalDpi xmlns:a14="http://schemas.microsoft.com/office/drawing/2010/main" val="0"/>
@@ -4208,8 +4184,8 @@
         </p:blipFill>
         <p:spPr bwMode="auto">
           <a:xfrm>
-            <a:off x="1170819" y="1600198"/>
-            <a:ext cx="2327550" cy="2768451"/>
+            <a:off x="501075" y="2134813"/>
+            <a:ext cx="3523683" cy="1421659"/>
           </a:xfrm>
           <a:prstGeom prst="rect">
             <a:avLst/>
@@ -4229,7 +4205,7 @@
     </p:spTree>
     <p:extLst>
       <p:ext uri="{BB962C8B-B14F-4D97-AF65-F5344CB8AC3E}">
-        <p14:creationId xmlns:p14="http://schemas.microsoft.com/office/powerpoint/2010/main" val="1803584850"/>
+        <p14:creationId xmlns:p14="http://schemas.microsoft.com/office/powerpoint/2010/main" val="299814519"/>
       </p:ext>
     </p:extLst>
   </p:cSld>
@@ -4258,7 +4234,7 @@
       </p:grpSpPr>
       <p:sp>
         <p:nvSpPr>
-          <p:cNvPr id="12" name="Rectangle 11"/>
+          <p:cNvPr id="7" name="Rectangle 6"/>
           <p:cNvSpPr>
             <a:spLocks noGrp="1" noRot="1" noChangeAspect="1" noMove="1" noResize="1" noEditPoints="1" noAdjustHandles="1" noChangeArrowheads="1" noChangeShapeType="1" noTextEdit="1"/>
           </p:cNvSpPr>
@@ -4289,7 +4265,7 @@
       </p:sp>
       <p:sp>
         <p:nvSpPr>
-          <p:cNvPr id="14" name="Rectangle 13"/>
+          <p:cNvPr id="9" name="Rectangle 8"/>
           <p:cNvSpPr>
             <a:spLocks noGrp="1" noRot="1" noChangeAspect="1" noMove="1" noResize="1" noEditPoints="1" noAdjustHandles="1" noChangeArrowheads="1" noChangeShapeType="1" noTextEdit="1"/>
           </p:cNvSpPr>
@@ -4301,33 +4277,34 @@
             </p:extLst>
           </p:nvPr>
         </p:nvSpPr>
-        <p:spPr>
-          <a:xfrm>
-            <a:off x="0" y="2"/>
-            <a:ext cx="4636008" cy="6857998"/>
+        <p:spPr bwMode="ltGray">
+          <a:xfrm>
+            <a:off x="321564" y="320040"/>
+            <a:ext cx="11548872" cy="6217920"/>
           </a:xfrm>
           <a:prstGeom prst="rect">
             <a:avLst/>
           </a:prstGeom>
           <a:solidFill>
             <a:schemeClr val="tx1">
-              <a:lumMod val="85000"/>
-              <a:lumOff val="15000"/>
+              <a:lumMod val="75000"/>
+              <a:lumOff val="25000"/>
             </a:schemeClr>
           </a:solidFill>
-          <a:ln>
+          <a:ln w="127000" cap="sq" cmpd="thinThick">
             <a:noFill/>
           </a:ln>
-          <a:effectLst/>
         </p:spPr>
         <p:style>
-          <a:lnRef idx="1">
-            <a:schemeClr val="accent1"/>
+          <a:lnRef idx="2">
+            <a:schemeClr val="accent1">
+              <a:shade val="50000"/>
+            </a:schemeClr>
           </a:lnRef>
-          <a:fillRef idx="3">
+          <a:fillRef idx="1">
             <a:schemeClr val="accent1"/>
           </a:fillRef>
-          <a:effectRef idx="2">
+          <a:effectRef idx="0">
             <a:schemeClr val="accent1"/>
           </a:effectRef>
           <a:fontRef idx="minor">
@@ -4338,16 +4315,54 @@
           <a:bodyPr rtlCol="0" anchor="ctr"/>
           <a:lstStyle/>
           <a:p>
-            <a:pPr algn="ctr" defTabSz="457200"/>
-            <a:endParaRPr lang="en-US">
-              <a:solidFill>
-                <a:srgbClr val="FFFFFF"/>
-              </a:solidFill>
-              <a:latin typeface="Calibri" panose="020F0502020204030204"/>
-            </a:endParaRPr>
-          </a:p>
-        </p:txBody>
-      </p:sp>
+            <a:pPr algn="ctr"/>
+            <a:endParaRPr lang="en-US"/>
+          </a:p>
+        </p:txBody>
+      </p:sp>
+      <p:cxnSp>
+        <p:nvCxnSpPr>
+          <p:cNvPr id="11" name="Straight Connector 10"/>
+          <p:cNvCxnSpPr>
+            <a:cxnSpLocks noGrp="1" noRot="1" noChangeAspect="1" noMove="1" noResize="1" noEditPoints="1" noAdjustHandles="1" noChangeArrowheads="1" noChangeShapeType="1"/>
+          </p:cNvCxnSpPr>
+          <p:nvPr>
+            <p:extLst>
+              <p:ext uri="{386F3935-93C4-4BCD-93E2-E3B085C9AB24}">
+                <p16:designElem xmlns:p16="http://schemas.microsoft.com/office/powerpoint/2015/main" val="1"/>
+              </p:ext>
+            </p:extLst>
+          </p:nvPr>
+        </p:nvCxnSpPr>
+        <p:spPr>
+          <a:xfrm>
+            <a:off x="4055891" y="2057399"/>
+            <a:ext cx="0" cy="2743200"/>
+          </a:xfrm>
+          <a:prstGeom prst="line">
+            <a:avLst/>
+          </a:prstGeom>
+          <a:ln w="19050">
+            <a:solidFill>
+              <a:schemeClr val="bg1"/>
+            </a:solidFill>
+          </a:ln>
+        </p:spPr>
+        <p:style>
+          <a:lnRef idx="1">
+            <a:schemeClr val="accent1"/>
+          </a:lnRef>
+          <a:fillRef idx="0">
+            <a:schemeClr val="accent1"/>
+          </a:fillRef>
+          <a:effectRef idx="0">
+            <a:schemeClr val="accent1"/>
+          </a:effectRef>
+          <a:fontRef idx="minor">
+            <a:schemeClr val="tx1"/>
+          </a:fontRef>
+        </p:style>
+      </p:cxnSp>
       <p:sp>
         <p:nvSpPr>
           <p:cNvPr id="2" name="Title 1"/>
@@ -4360,8 +4375,8 @@
         </p:nvSpPr>
         <p:spPr>
           <a:xfrm>
-            <a:off x="501075" y="0"/>
-            <a:ext cx="3667039" cy="1676603"/>
+            <a:off x="4204172" y="965198"/>
+            <a:ext cx="6766078" cy="4927601"/>
           </a:xfrm>
         </p:spPr>
         <p:txBody>
@@ -4370,156 +4385,22 @@
           </a:bodyPr>
           <a:lstStyle/>
           <a:p>
-            <a:pPr algn="ctr"/>
-            <a:r>
-              <a:rPr lang="en-US" sz="3600" b="1" dirty="0">
+            <a:r>
+              <a:rPr lang="en-US" sz="6000" b="1" dirty="0">
                 <a:solidFill>
                   <a:schemeClr val="bg1"/>
                 </a:solidFill>
                 <a:latin typeface="Garamond" panose="02020404030301010803" pitchFamily="18" charset="0"/>
               </a:rPr>
-              <a:t>Framework</a:t>
-            </a:r>
-          </a:p>
-        </p:txBody>
-      </p:sp>
-      <p:sp>
-        <p:nvSpPr>
-          <p:cNvPr id="4" name="Text Placeholder 3"/>
-          <p:cNvSpPr>
-            <a:spLocks noGrp="1"/>
-          </p:cNvSpPr>
-          <p:nvPr>
-            <p:ph type="body" sz="half" idx="2"/>
-          </p:nvPr>
-        </p:nvSpPr>
-        <p:spPr>
-          <a:xfrm>
-            <a:off x="501075" y="4404897"/>
-            <a:ext cx="3667036" cy="3779520"/>
-          </a:xfrm>
-        </p:spPr>
-        <p:txBody>
-          <a:bodyPr vert="horz" lIns="91440" tIns="45720" rIns="91440" bIns="45720" rtlCol="0">
-            <a:normAutofit/>
-          </a:bodyPr>
-          <a:lstStyle/>
-          <a:p>
-            <a:pPr algn="ctr"/>
-            <a:r>
-              <a:rPr lang="en-US" sz="2400" dirty="0">
-                <a:solidFill>
-                  <a:schemeClr val="bg1"/>
-                </a:solidFill>
-                <a:latin typeface="Batang" panose="02030600000101010101" pitchFamily="18" charset="-127"/>
-                <a:ea typeface="Batang" panose="02030600000101010101" pitchFamily="18" charset="-127"/>
-              </a:rPr>
-              <a:t>Purpose: </a:t>
-            </a:r>
-          </a:p>
-          <a:p>
-            <a:pPr algn="ctr"/>
-            <a:r>
-              <a:rPr lang="en-US" sz="2400" dirty="0">
-                <a:solidFill>
-                  <a:schemeClr val="bg1"/>
-                </a:solidFill>
-                <a:latin typeface="Batang" panose="02030600000101010101" pitchFamily="18" charset="-127"/>
-                <a:ea typeface="Batang" panose="02030600000101010101" pitchFamily="18" charset="-127"/>
-              </a:rPr>
-              <a:t>We used this to develop the code needed for the app</a:t>
-            </a:r>
-          </a:p>
-          <a:p>
-            <a:pPr algn="ctr"/>
-            <a:r>
-              <a:rPr lang="en-US" sz="6000" dirty="0">
-                <a:solidFill>
-                  <a:srgbClr val="FF0000"/>
-                </a:solidFill>
-                <a:latin typeface="Garamond" panose="02020404030301010803" pitchFamily="18" charset="0"/>
-                <a:ea typeface="Batang" panose="02030600000101010101" pitchFamily="18" charset="-127"/>
-              </a:rPr>
-              <a:t>3</a:t>
-            </a:r>
-          </a:p>
-        </p:txBody>
-      </p:sp>
-      <p:pic>
-        <p:nvPicPr>
-          <p:cNvPr id="6" name="Picture 5"/>
-          <p:cNvPicPr>
-            <a:picLocks noChangeAspect="1"/>
-          </p:cNvPicPr>
-          <p:nvPr/>
-        </p:nvPicPr>
-        <p:blipFill>
-          <a:blip r:embed="rId2">
-            <a:extLst>
-              <a:ext uri="{28A0092B-C50C-407E-A947-70E740481C1C}">
-                <a14:useLocalDpi xmlns:a14="http://schemas.microsoft.com/office/drawing/2010/main" val="0"/>
-              </a:ext>
-            </a:extLst>
-          </a:blip>
-          <a:stretch>
-            <a:fillRect/>
-          </a:stretch>
-        </p:blipFill>
-        <p:spPr>
-          <a:xfrm>
-            <a:off x="4786313" y="667629"/>
-            <a:ext cx="7300912" cy="5204534"/>
-          </a:xfrm>
-          <a:prstGeom prst="rect">
-            <a:avLst/>
-          </a:prstGeom>
-        </p:spPr>
-      </p:pic>
-      <p:pic>
-        <p:nvPicPr>
-          <p:cNvPr id="3074" name="Picture 2" descr="https://3.bp.blogspot.com/-DPRLHrqBbvU/VtCdm79QAdI/AAAAAAAAAko/576y8WmN8xM/s1600/lll.png"/>
-          <p:cNvPicPr>
-            <a:picLocks noChangeAspect="1" noChangeArrowheads="1"/>
-          </p:cNvPicPr>
-          <p:nvPr/>
-        </p:nvPicPr>
-        <p:blipFill>
-          <a:blip r:embed="rId3">
-            <a:extLst>
-              <a:ext uri="{28A0092B-C50C-407E-A947-70E740481C1C}">
-                <a14:useLocalDpi xmlns:a14="http://schemas.microsoft.com/office/drawing/2010/main" val="0"/>
-              </a:ext>
-            </a:extLst>
-          </a:blip>
-          <a:srcRect/>
-          <a:stretch>
-            <a:fillRect/>
-          </a:stretch>
-        </p:blipFill>
-        <p:spPr bwMode="auto">
-          <a:xfrm>
-            <a:off x="501075" y="2134813"/>
-            <a:ext cx="3523683" cy="1421659"/>
-          </a:xfrm>
-          <a:prstGeom prst="rect">
-            <a:avLst/>
-          </a:prstGeom>
-          <a:noFill/>
-          <a:extLst>
-            <a:ext uri="{909E8E84-426E-40DD-AFC4-6F175D3DCCD1}">
-              <a14:hiddenFill xmlns:a14="http://schemas.microsoft.com/office/drawing/2010/main">
-                <a:solidFill>
-                  <a:srgbClr val="FFFFFF"/>
-                </a:solidFill>
-              </a14:hiddenFill>
-            </a:ext>
-          </a:extLst>
-        </p:spPr>
-      </p:pic>
+              <a:t>Challenges</a:t>
+            </a:r>
+          </a:p>
+        </p:txBody>
+      </p:sp>
     </p:spTree>
     <p:extLst>
       <p:ext uri="{BB962C8B-B14F-4D97-AF65-F5344CB8AC3E}">
-        <p14:creationId xmlns:p14="http://schemas.microsoft.com/office/powerpoint/2010/main" val="299814519"/>
+        <p14:creationId xmlns:p14="http://schemas.microsoft.com/office/powerpoint/2010/main" val="1602079093"/>
       </p:ext>
     </p:extLst>
   </p:cSld>
@@ -4548,7 +4429,7 @@
       </p:grpSpPr>
       <p:sp>
         <p:nvSpPr>
-          <p:cNvPr id="7" name="Rectangle 6"/>
+          <p:cNvPr id="8" name="Rectangle 7"/>
           <p:cNvSpPr>
             <a:spLocks noGrp="1" noRot="1" noChangeAspect="1" noMove="1" noResize="1" noEditPoints="1" noAdjustHandles="1" noChangeArrowheads="1" noChangeShapeType="1" noTextEdit="1"/>
           </p:cNvSpPr>
@@ -4560,52 +4441,21 @@
             </p:extLst>
           </p:nvPr>
         </p:nvSpPr>
-        <p:spPr bwMode="white">
-          <a:xfrm>
-            <a:off x="0" y="0"/>
-            <a:ext cx="12192000" cy="6858000"/>
-          </a:xfrm>
-          <a:prstGeom prst="rect">
-            <a:avLst/>
-          </a:prstGeom>
-          <a:solidFill>
-            <a:schemeClr val="bg1"/>
-          </a:solidFill>
-          <a:ln>
-            <a:noFill/>
-          </a:ln>
-          <a:effectLst/>
-        </p:spPr>
-      </p:sp>
-      <p:sp>
-        <p:nvSpPr>
-          <p:cNvPr id="9" name="Rectangle 8"/>
-          <p:cNvSpPr>
-            <a:spLocks noGrp="1" noRot="1" noChangeAspect="1" noMove="1" noResize="1" noEditPoints="1" noAdjustHandles="1" noChangeArrowheads="1" noChangeShapeType="1" noTextEdit="1"/>
-          </p:cNvSpPr>
-          <p:nvPr>
-            <p:extLst>
-              <p:ext uri="{386F3935-93C4-4BCD-93E2-E3B085C9AB24}">
-                <p16:designElem xmlns:p16="http://schemas.microsoft.com/office/powerpoint/2015/main" val="1"/>
-              </p:ext>
-            </p:extLst>
-          </p:nvPr>
-        </p:nvSpPr>
-        <p:spPr bwMode="ltGray">
-          <a:xfrm>
-            <a:off x="321564" y="320040"/>
-            <a:ext cx="11548872" cy="6217920"/>
+        <p:spPr>
+          <a:xfrm>
+            <a:off x="5315061" y="-2"/>
+            <a:ext cx="6876939" cy="6858002"/>
           </a:xfrm>
           <a:prstGeom prst="rect">
             <a:avLst/>
           </a:prstGeom>
           <a:solidFill>
             <a:schemeClr val="tx1">
-              <a:lumMod val="75000"/>
-              <a:lumOff val="25000"/>
+              <a:lumMod val="85000"/>
+              <a:lumOff val="15000"/>
             </a:schemeClr>
           </a:solidFill>
-          <a:ln w="127000" cap="sq" cmpd="thinThick">
+          <a:ln>
             <a:noFill/>
           </a:ln>
         </p:spPr>
@@ -4634,87 +4484,222 @@
           </a:p>
         </p:txBody>
       </p:sp>
-      <p:cxnSp>
-        <p:nvCxnSpPr>
-          <p:cNvPr id="11" name="Straight Connector 10"/>
-          <p:cNvCxnSpPr>
-            <a:cxnSpLocks noGrp="1" noRot="1" noChangeAspect="1" noMove="1" noResize="1" noEditPoints="1" noAdjustHandles="1" noChangeArrowheads="1" noChangeShapeType="1"/>
-          </p:cNvCxnSpPr>
-          <p:nvPr>
-            <p:extLst>
-              <p:ext uri="{386F3935-93C4-4BCD-93E2-E3B085C9AB24}">
-                <p16:designElem xmlns:p16="http://schemas.microsoft.com/office/powerpoint/2015/main" val="1"/>
-              </p:ext>
-            </p:extLst>
-          </p:nvPr>
-        </p:nvCxnSpPr>
-        <p:spPr>
-          <a:xfrm>
-            <a:off x="4055891" y="2057399"/>
-            <a:ext cx="0" cy="2743200"/>
-          </a:xfrm>
-          <a:prstGeom prst="line">
-            <a:avLst/>
-          </a:prstGeom>
-          <a:ln w="19050">
-            <a:solidFill>
-              <a:schemeClr val="bg1"/>
-            </a:solidFill>
+      <p:sp>
+        <p:nvSpPr>
+          <p:cNvPr id="2" name="Title 1"/>
+          <p:cNvSpPr>
+            <a:spLocks noGrp="1"/>
+          </p:cNvSpPr>
+          <p:nvPr>
+            <p:ph type="title"/>
+          </p:nvPr>
+        </p:nvSpPr>
+        <p:spPr>
+          <a:xfrm>
+            <a:off x="829781" y="2745736"/>
+            <a:ext cx="3698803" cy="1366528"/>
+          </a:xfrm>
+          <a:solidFill>
+            <a:schemeClr val="bg1">
+              <a:alpha val="50000"/>
+            </a:schemeClr>
+          </a:solidFill>
+          <a:ln w="25400" cap="sq">
+            <a:noFill/>
+            <a:miter lim="800000"/>
           </a:ln>
         </p:spPr>
-        <p:style>
-          <a:lnRef idx="1">
-            <a:schemeClr val="accent1"/>
-          </a:lnRef>
-          <a:fillRef idx="0">
-            <a:schemeClr val="accent1"/>
-          </a:fillRef>
-          <a:effectRef idx="0">
-            <a:schemeClr val="accent1"/>
-          </a:effectRef>
-          <a:fontRef idx="minor">
-            <a:schemeClr val="tx1"/>
-          </a:fontRef>
-        </p:style>
-      </p:cxnSp>
-      <p:sp>
-        <p:nvSpPr>
-          <p:cNvPr id="2" name="Title 1"/>
-          <p:cNvSpPr>
-            <a:spLocks noGrp="1"/>
-          </p:cNvSpPr>
-          <p:nvPr>
-            <p:ph type="title"/>
-          </p:nvPr>
-        </p:nvSpPr>
-        <p:spPr>
-          <a:xfrm>
-            <a:off x="4204172" y="965198"/>
-            <a:ext cx="6766078" cy="4927601"/>
-          </a:xfrm>
-        </p:spPr>
-        <p:txBody>
-          <a:bodyPr vert="horz" lIns="91440" tIns="45720" rIns="91440" bIns="45720" rtlCol="0" anchor="ctr">
+        <p:txBody>
+          <a:bodyPr>
             <a:normAutofit/>
           </a:bodyPr>
           <a:lstStyle/>
           <a:p>
-            <a:r>
-              <a:rPr lang="en-US" sz="6000" b="1" dirty="0">
+            <a:pPr algn="ctr"/>
+            <a:r>
+              <a:rPr lang="en-US" sz="4000" b="1" dirty="0">
+                <a:latin typeface="Garamond" panose="02020404030301010803" pitchFamily="18" charset="0"/>
+              </a:rPr>
+              <a:t>Challenges</a:t>
+            </a:r>
+          </a:p>
+        </p:txBody>
+      </p:sp>
+      <p:sp>
+        <p:nvSpPr>
+          <p:cNvPr id="3" name="Content Placeholder 2"/>
+          <p:cNvSpPr>
+            <a:spLocks noGrp="1"/>
+          </p:cNvSpPr>
+          <p:nvPr>
+            <p:ph idx="1"/>
+          </p:nvPr>
+        </p:nvSpPr>
+        <p:spPr>
+          <a:xfrm>
+            <a:off x="5802047" y="311870"/>
+            <a:ext cx="5408696" cy="6234257"/>
+          </a:xfrm>
+        </p:spPr>
+        <p:txBody>
+          <a:bodyPr anchor="ctr">
+            <a:normAutofit fontScale="92500" lnSpcReduction="10000"/>
+          </a:bodyPr>
+          <a:lstStyle/>
+          <a:p>
+            <a:r>
+              <a:rPr lang="en-US" sz="3000" dirty="0">
                 <a:solidFill>
                   <a:schemeClr val="bg1"/>
                 </a:solidFill>
-                <a:latin typeface="Garamond" panose="02020404030301010803" pitchFamily="18" charset="0"/>
+                <a:latin typeface="Batang" panose="02030600000101010101" pitchFamily="18" charset="-127"/>
+                <a:ea typeface="Batang" panose="02030600000101010101" pitchFamily="18" charset="-127"/>
               </a:rPr>
-              <a:t>Challenges</a:t>
-            </a:r>
+              <a:t>Integration</a:t>
+            </a:r>
+          </a:p>
+          <a:p>
+            <a:pPr lvl="1"/>
+            <a:r>
+              <a:rPr lang="en-US" dirty="0">
+                <a:solidFill>
+                  <a:schemeClr val="bg1"/>
+                </a:solidFill>
+                <a:latin typeface="Batang" panose="02030600000101010101" pitchFamily="18" charset="-127"/>
+                <a:ea typeface="Batang" panose="02030600000101010101" pitchFamily="18" charset="-127"/>
+              </a:rPr>
+              <a:t>We took care of different parts separately, so integrating them caused conflicts/bugs</a:t>
+            </a:r>
+          </a:p>
+          <a:p>
+            <a:pPr lvl="1"/>
+            <a:r>
+              <a:rPr lang="en-US" dirty="0">
+                <a:solidFill>
+                  <a:schemeClr val="bg1"/>
+                </a:solidFill>
+                <a:latin typeface="Batang" panose="02030600000101010101" pitchFamily="18" charset="-127"/>
+                <a:ea typeface="Batang" panose="02030600000101010101" pitchFamily="18" charset="-127"/>
+              </a:rPr>
+              <a:t>Used peer review in person/team viewer to fix</a:t>
+            </a:r>
+          </a:p>
+          <a:p>
+            <a:pPr marL="457200" lvl="1" indent="0">
+              <a:buNone/>
+            </a:pPr>
+            <a:endParaRPr lang="en-US" sz="2600" dirty="0">
+              <a:solidFill>
+                <a:schemeClr val="bg1"/>
+              </a:solidFill>
+              <a:latin typeface="Batang" panose="02030600000101010101" pitchFamily="18" charset="-127"/>
+              <a:ea typeface="Batang" panose="02030600000101010101" pitchFamily="18" charset="-127"/>
+            </a:endParaRPr>
+          </a:p>
+          <a:p>
+            <a:r>
+              <a:rPr lang="en-US" sz="3000" dirty="0">
+                <a:solidFill>
+                  <a:schemeClr val="bg1"/>
+                </a:solidFill>
+                <a:latin typeface="Batang" panose="02030600000101010101" pitchFamily="18" charset="-127"/>
+                <a:ea typeface="Batang" panose="02030600000101010101" pitchFamily="18" charset="-127"/>
+              </a:rPr>
+              <a:t>Friends feature</a:t>
+            </a:r>
+          </a:p>
+          <a:p>
+            <a:pPr lvl="1"/>
+            <a:r>
+              <a:rPr lang="en-US" dirty="0">
+                <a:solidFill>
+                  <a:schemeClr val="bg1"/>
+                </a:solidFill>
+                <a:latin typeface="Batang" panose="02030600000101010101" pitchFamily="18" charset="-127"/>
+                <a:ea typeface="Batang" panose="02030600000101010101" pitchFamily="18" charset="-127"/>
+              </a:rPr>
+              <a:t>More complex to develop</a:t>
+            </a:r>
+          </a:p>
+          <a:p>
+            <a:pPr lvl="1"/>
+            <a:r>
+              <a:rPr lang="en-US" dirty="0">
+                <a:solidFill>
+                  <a:schemeClr val="bg1"/>
+                </a:solidFill>
+                <a:latin typeface="Batang" panose="02030600000101010101" pitchFamily="18" charset="-127"/>
+                <a:ea typeface="Batang" panose="02030600000101010101" pitchFamily="18" charset="-127"/>
+              </a:rPr>
+              <a:t>Decided that it wasn’t needed for the purpose of the app</a:t>
+            </a:r>
+          </a:p>
+          <a:p>
+            <a:pPr marL="457200" lvl="1" indent="0">
+              <a:buNone/>
+            </a:pPr>
+            <a:endParaRPr lang="en-US" dirty="0">
+              <a:solidFill>
+                <a:schemeClr val="bg1"/>
+              </a:solidFill>
+              <a:latin typeface="Batang" panose="02030600000101010101" pitchFamily="18" charset="-127"/>
+              <a:ea typeface="Batang" panose="02030600000101010101" pitchFamily="18" charset="-127"/>
+            </a:endParaRPr>
+          </a:p>
+          <a:p>
+            <a:r>
+              <a:rPr lang="en-US" sz="3000" dirty="0">
+                <a:solidFill>
+                  <a:schemeClr val="bg1"/>
+                </a:solidFill>
+                <a:latin typeface="Batang" panose="02030600000101010101" pitchFamily="18" charset="-127"/>
+                <a:ea typeface="Batang" panose="02030600000101010101" pitchFamily="18" charset="-127"/>
+              </a:rPr>
+              <a:t>Off campus events</a:t>
+            </a:r>
+          </a:p>
+          <a:p>
+            <a:pPr lvl="1"/>
+            <a:r>
+              <a:rPr lang="en-US" dirty="0">
+                <a:solidFill>
+                  <a:schemeClr val="bg1"/>
+                </a:solidFill>
+                <a:latin typeface="Batang" panose="02030600000101010101" pitchFamily="18" charset="-127"/>
+                <a:ea typeface="Batang" panose="02030600000101010101" pitchFamily="18" charset="-127"/>
+              </a:rPr>
+              <a:t>More concerned with on campus events </a:t>
+            </a:r>
+          </a:p>
+          <a:p>
+            <a:pPr lvl="1"/>
+            <a:r>
+              <a:rPr lang="en-US" dirty="0">
+                <a:solidFill>
+                  <a:schemeClr val="bg1"/>
+                </a:solidFill>
+                <a:latin typeface="Batang" panose="02030600000101010101" pitchFamily="18" charset="-127"/>
+                <a:ea typeface="Batang" panose="02030600000101010101" pitchFamily="18" charset="-127"/>
+              </a:rPr>
+              <a:t>Didn’t deem it to be necessary for original purpose</a:t>
+            </a:r>
+          </a:p>
+          <a:p>
+            <a:pPr marL="0" indent="0">
+              <a:buNone/>
+            </a:pPr>
+            <a:endParaRPr lang="en-US" sz="2400" dirty="0">
+              <a:solidFill>
+                <a:schemeClr val="bg1"/>
+              </a:solidFill>
+            </a:endParaRPr>
           </a:p>
         </p:txBody>
       </p:sp>
     </p:spTree>
     <p:extLst>
       <p:ext uri="{BB962C8B-B14F-4D97-AF65-F5344CB8AC3E}">
-        <p14:creationId xmlns:p14="http://schemas.microsoft.com/office/powerpoint/2010/main" val="1602079093"/>
+        <p14:creationId xmlns:p14="http://schemas.microsoft.com/office/powerpoint/2010/main" val="1833779197"/>
       </p:ext>
     </p:extLst>
   </p:cSld>
@@ -4743,7 +4728,7 @@
       </p:grpSpPr>
       <p:sp>
         <p:nvSpPr>
-          <p:cNvPr id="8" name="Rectangle 7"/>
+          <p:cNvPr id="7" name="Rectangle 6"/>
           <p:cNvSpPr>
             <a:spLocks noGrp="1" noRot="1" noChangeAspect="1" noMove="1" noResize="1" noEditPoints="1" noAdjustHandles="1" noChangeArrowheads="1" noChangeShapeType="1" noTextEdit="1"/>
           </p:cNvSpPr>
@@ -4755,21 +4740,52 @@
             </p:extLst>
           </p:nvPr>
         </p:nvSpPr>
-        <p:spPr>
-          <a:xfrm>
-            <a:off x="5315061" y="-2"/>
-            <a:ext cx="6876939" cy="6858002"/>
+        <p:spPr bwMode="white">
+          <a:xfrm>
+            <a:off x="0" y="0"/>
+            <a:ext cx="12192000" cy="6858000"/>
+          </a:xfrm>
+          <a:prstGeom prst="rect">
+            <a:avLst/>
+          </a:prstGeom>
+          <a:solidFill>
+            <a:schemeClr val="bg1"/>
+          </a:solidFill>
+          <a:ln>
+            <a:noFill/>
+          </a:ln>
+          <a:effectLst/>
+        </p:spPr>
+      </p:sp>
+      <p:sp>
+        <p:nvSpPr>
+          <p:cNvPr id="9" name="Rectangle 8"/>
+          <p:cNvSpPr>
+            <a:spLocks noGrp="1" noRot="1" noChangeAspect="1" noMove="1" noResize="1" noEditPoints="1" noAdjustHandles="1" noChangeArrowheads="1" noChangeShapeType="1" noTextEdit="1"/>
+          </p:cNvSpPr>
+          <p:nvPr>
+            <p:extLst>
+              <p:ext uri="{386F3935-93C4-4BCD-93E2-E3B085C9AB24}">
+                <p16:designElem xmlns:p16="http://schemas.microsoft.com/office/powerpoint/2015/main" val="1"/>
+              </p:ext>
+            </p:extLst>
+          </p:nvPr>
+        </p:nvSpPr>
+        <p:spPr bwMode="ltGray">
+          <a:xfrm>
+            <a:off x="321564" y="320040"/>
+            <a:ext cx="11548872" cy="6217920"/>
           </a:xfrm>
           <a:prstGeom prst="rect">
             <a:avLst/>
           </a:prstGeom>
           <a:solidFill>
             <a:schemeClr val="tx1">
-              <a:lumMod val="85000"/>
-              <a:lumOff val="15000"/>
+              <a:lumMod val="75000"/>
+              <a:lumOff val="25000"/>
             </a:schemeClr>
           </a:solidFill>
-          <a:ln>
+          <a:ln w="127000" cap="sq" cmpd="thinThick">
             <a:noFill/>
           </a:ln>
         </p:spPr>
@@ -4798,286 +4814,6 @@
           </a:p>
         </p:txBody>
       </p:sp>
-      <p:sp>
-        <p:nvSpPr>
-          <p:cNvPr id="2" name="Title 1"/>
-          <p:cNvSpPr>
-            <a:spLocks noGrp="1"/>
-          </p:cNvSpPr>
-          <p:nvPr>
-            <p:ph type="title"/>
-          </p:nvPr>
-        </p:nvSpPr>
-        <p:spPr>
-          <a:xfrm>
-            <a:off x="829781" y="2745736"/>
-            <a:ext cx="3698803" cy="1366528"/>
-          </a:xfrm>
-          <a:solidFill>
-            <a:schemeClr val="bg1">
-              <a:alpha val="50000"/>
-            </a:schemeClr>
-          </a:solidFill>
-          <a:ln w="25400" cap="sq">
-            <a:noFill/>
-            <a:miter lim="800000"/>
-          </a:ln>
-        </p:spPr>
-        <p:txBody>
-          <a:bodyPr>
-            <a:normAutofit/>
-          </a:bodyPr>
-          <a:lstStyle/>
-          <a:p>
-            <a:pPr algn="ctr"/>
-            <a:r>
-              <a:rPr lang="en-US" sz="4000" b="1" dirty="0">
-                <a:latin typeface="Garamond" panose="02020404030301010803" pitchFamily="18" charset="0"/>
-              </a:rPr>
-              <a:t>Challenges</a:t>
-            </a:r>
-          </a:p>
-        </p:txBody>
-      </p:sp>
-      <p:sp>
-        <p:nvSpPr>
-          <p:cNvPr id="3" name="Content Placeholder 2"/>
-          <p:cNvSpPr>
-            <a:spLocks noGrp="1"/>
-          </p:cNvSpPr>
-          <p:nvPr>
-            <p:ph idx="1"/>
-          </p:nvPr>
-        </p:nvSpPr>
-        <p:spPr>
-          <a:xfrm>
-            <a:off x="6049182" y="802638"/>
-            <a:ext cx="5408696" cy="5252722"/>
-          </a:xfrm>
-        </p:spPr>
-        <p:txBody>
-          <a:bodyPr anchor="ctr">
-            <a:normAutofit/>
-          </a:bodyPr>
-          <a:lstStyle/>
-          <a:p>
-            <a:r>
-              <a:rPr lang="en-US" sz="3000" dirty="0">
-                <a:solidFill>
-                  <a:schemeClr val="bg1"/>
-                </a:solidFill>
-                <a:latin typeface="Batang" panose="02030600000101010101" pitchFamily="18" charset="-127"/>
-                <a:ea typeface="Batang" panose="02030600000101010101" pitchFamily="18" charset="-127"/>
-              </a:rPr>
-              <a:t>Friends feature</a:t>
-            </a:r>
-          </a:p>
-          <a:p>
-            <a:pPr lvl="1"/>
-            <a:r>
-              <a:rPr lang="en-US" dirty="0">
-                <a:solidFill>
-                  <a:schemeClr val="bg1"/>
-                </a:solidFill>
-                <a:latin typeface="Batang" panose="02030600000101010101" pitchFamily="18" charset="-127"/>
-                <a:ea typeface="Batang" panose="02030600000101010101" pitchFamily="18" charset="-127"/>
-              </a:rPr>
-              <a:t>More complex to develop</a:t>
-            </a:r>
-          </a:p>
-          <a:p>
-            <a:pPr lvl="1"/>
-            <a:r>
-              <a:rPr lang="en-US" dirty="0">
-                <a:solidFill>
-                  <a:schemeClr val="bg1"/>
-                </a:solidFill>
-                <a:latin typeface="Batang" panose="02030600000101010101" pitchFamily="18" charset="-127"/>
-                <a:ea typeface="Batang" panose="02030600000101010101" pitchFamily="18" charset="-127"/>
-              </a:rPr>
-              <a:t>Decided that it wasn’t needed for the purpose of the app</a:t>
-            </a:r>
-          </a:p>
-          <a:p>
-            <a:pPr marL="457200" lvl="1" indent="0">
-              <a:buNone/>
-            </a:pPr>
-            <a:endParaRPr lang="en-US" dirty="0">
-              <a:solidFill>
-                <a:schemeClr val="bg1"/>
-              </a:solidFill>
-              <a:latin typeface="Batang" panose="02030600000101010101" pitchFamily="18" charset="-127"/>
-              <a:ea typeface="Batang" panose="02030600000101010101" pitchFamily="18" charset="-127"/>
-            </a:endParaRPr>
-          </a:p>
-          <a:p>
-            <a:r>
-              <a:rPr lang="en-US" sz="3000" dirty="0">
-                <a:solidFill>
-                  <a:schemeClr val="bg1"/>
-                </a:solidFill>
-                <a:latin typeface="Batang" panose="02030600000101010101" pitchFamily="18" charset="-127"/>
-                <a:ea typeface="Batang" panose="02030600000101010101" pitchFamily="18" charset="-127"/>
-              </a:rPr>
-              <a:t>Off campus events</a:t>
-            </a:r>
-          </a:p>
-          <a:p>
-            <a:pPr lvl="1"/>
-            <a:r>
-              <a:rPr lang="en-US" dirty="0">
-                <a:solidFill>
-                  <a:schemeClr val="bg1"/>
-                </a:solidFill>
-                <a:latin typeface="Batang" panose="02030600000101010101" pitchFamily="18" charset="-127"/>
-                <a:ea typeface="Batang" panose="02030600000101010101" pitchFamily="18" charset="-127"/>
-              </a:rPr>
-              <a:t>More concerned with on campus events</a:t>
-            </a:r>
-          </a:p>
-          <a:p>
-            <a:pPr lvl="1"/>
-            <a:r>
-              <a:rPr lang="en-US" dirty="0">
-                <a:solidFill>
-                  <a:schemeClr val="bg1"/>
-                </a:solidFill>
-                <a:latin typeface="Batang" panose="02030600000101010101" pitchFamily="18" charset="-127"/>
-                <a:ea typeface="Batang" panose="02030600000101010101" pitchFamily="18" charset="-127"/>
-              </a:rPr>
-              <a:t>Didn’t deem it to be necessary for original purpose</a:t>
-            </a:r>
-          </a:p>
-          <a:p>
-            <a:pPr marL="0" indent="0">
-              <a:buNone/>
-            </a:pPr>
-            <a:endParaRPr lang="en-US" sz="2400" dirty="0">
-              <a:solidFill>
-                <a:schemeClr val="bg1"/>
-              </a:solidFill>
-            </a:endParaRPr>
-          </a:p>
-        </p:txBody>
-      </p:sp>
-    </p:spTree>
-    <p:extLst>
-      <p:ext uri="{BB962C8B-B14F-4D97-AF65-F5344CB8AC3E}">
-        <p14:creationId xmlns:p14="http://schemas.microsoft.com/office/powerpoint/2010/main" val="1833779197"/>
-      </p:ext>
-    </p:extLst>
-  </p:cSld>
-  <p:clrMapOvr>
-    <a:masterClrMapping/>
-  </p:clrMapOvr>
-</p:sld>
-</file>
-
-<file path=ppt/slides/slide16.xml><?xml version="1.0" encoding="utf-8"?>
-<p:sld xmlns:a="http://schemas.openxmlformats.org/drawingml/2006/main" xmlns:r="http://schemas.openxmlformats.org/officeDocument/2006/relationships" xmlns:p="http://schemas.openxmlformats.org/presentationml/2006/main">
-  <p:cSld>
-    <p:spTree>
-      <p:nvGrpSpPr>
-        <p:cNvPr id="1" name=""/>
-        <p:cNvGrpSpPr/>
-        <p:nvPr/>
-      </p:nvGrpSpPr>
-      <p:grpSpPr>
-        <a:xfrm>
-          <a:off x="0" y="0"/>
-          <a:ext cx="0" cy="0"/>
-          <a:chOff x="0" y="0"/>
-          <a:chExt cx="0" cy="0"/>
-        </a:xfrm>
-      </p:grpSpPr>
-      <p:sp>
-        <p:nvSpPr>
-          <p:cNvPr id="7" name="Rectangle 6"/>
-          <p:cNvSpPr>
-            <a:spLocks noGrp="1" noRot="1" noChangeAspect="1" noMove="1" noResize="1" noEditPoints="1" noAdjustHandles="1" noChangeArrowheads="1" noChangeShapeType="1" noTextEdit="1"/>
-          </p:cNvSpPr>
-          <p:nvPr>
-            <p:extLst>
-              <p:ext uri="{386F3935-93C4-4BCD-93E2-E3B085C9AB24}">
-                <p16:designElem xmlns:p16="http://schemas.microsoft.com/office/powerpoint/2015/main" val="1"/>
-              </p:ext>
-            </p:extLst>
-          </p:nvPr>
-        </p:nvSpPr>
-        <p:spPr bwMode="white">
-          <a:xfrm>
-            <a:off x="0" y="0"/>
-            <a:ext cx="12192000" cy="6858000"/>
-          </a:xfrm>
-          <a:prstGeom prst="rect">
-            <a:avLst/>
-          </a:prstGeom>
-          <a:solidFill>
-            <a:schemeClr val="bg1"/>
-          </a:solidFill>
-          <a:ln>
-            <a:noFill/>
-          </a:ln>
-          <a:effectLst/>
-        </p:spPr>
-      </p:sp>
-      <p:sp>
-        <p:nvSpPr>
-          <p:cNvPr id="9" name="Rectangle 8"/>
-          <p:cNvSpPr>
-            <a:spLocks noGrp="1" noRot="1" noChangeAspect="1" noMove="1" noResize="1" noEditPoints="1" noAdjustHandles="1" noChangeArrowheads="1" noChangeShapeType="1" noTextEdit="1"/>
-          </p:cNvSpPr>
-          <p:nvPr>
-            <p:extLst>
-              <p:ext uri="{386F3935-93C4-4BCD-93E2-E3B085C9AB24}">
-                <p16:designElem xmlns:p16="http://schemas.microsoft.com/office/powerpoint/2015/main" val="1"/>
-              </p:ext>
-            </p:extLst>
-          </p:nvPr>
-        </p:nvSpPr>
-        <p:spPr bwMode="ltGray">
-          <a:xfrm>
-            <a:off x="321564" y="320040"/>
-            <a:ext cx="11548872" cy="6217920"/>
-          </a:xfrm>
-          <a:prstGeom prst="rect">
-            <a:avLst/>
-          </a:prstGeom>
-          <a:solidFill>
-            <a:schemeClr val="tx1">
-              <a:lumMod val="75000"/>
-              <a:lumOff val="25000"/>
-            </a:schemeClr>
-          </a:solidFill>
-          <a:ln w="127000" cap="sq" cmpd="thinThick">
-            <a:noFill/>
-          </a:ln>
-        </p:spPr>
-        <p:style>
-          <a:lnRef idx="2">
-            <a:schemeClr val="accent1">
-              <a:shade val="50000"/>
-            </a:schemeClr>
-          </a:lnRef>
-          <a:fillRef idx="1">
-            <a:schemeClr val="accent1"/>
-          </a:fillRef>
-          <a:effectRef idx="0">
-            <a:schemeClr val="accent1"/>
-          </a:effectRef>
-          <a:fontRef idx="minor">
-            <a:schemeClr val="lt1"/>
-          </a:fontRef>
-        </p:style>
-        <p:txBody>
-          <a:bodyPr rtlCol="0" anchor="ctr"/>
-          <a:lstStyle/>
-          <a:p>
-            <a:pPr algn="ctr"/>
-            <a:endParaRPr lang="en-US"/>
-          </a:p>
-        </p:txBody>
-      </p:sp>
       <p:cxnSp>
         <p:nvCxnSpPr>
           <p:cNvPr id="11" name="Straight Connector 10"/>
@@ -5168,7 +4904,7 @@
 </p:sld>
 </file>
 
-<file path=ppt/slides/slide17.xml><?xml version="1.0" encoding="utf-8"?>
+<file path=ppt/slides/slide16.xml><?xml version="1.0" encoding="utf-8"?>
 <p:sld xmlns:a="http://schemas.openxmlformats.org/drawingml/2006/main" xmlns:r="http://schemas.openxmlformats.org/officeDocument/2006/relationships" xmlns:p="http://schemas.openxmlformats.org/presentationml/2006/main">
   <p:cSld>
     <p:spTree>
@@ -7068,7 +6804,7 @@
       </p:sp>
       <p:pic>
         <p:nvPicPr>
-          <p:cNvPr id="11" name="Picture 10"/>
+          <p:cNvPr id="8" name="Picture 7"/>
           <p:cNvPicPr>
             <a:picLocks noChangeAspect="1"/>
           </p:cNvPicPr>
@@ -7088,8 +6824,8 @@
         </p:blipFill>
         <p:spPr>
           <a:xfrm>
-            <a:off x="6096000" y="692459"/>
-            <a:ext cx="5382376" cy="5468113"/>
+            <a:off x="889254" y="1470661"/>
+            <a:ext cx="2857500" cy="2857500"/>
           </a:xfrm>
           <a:prstGeom prst="rect">
             <a:avLst/>
@@ -7098,50 +6834,32 @@
       </p:pic>
       <p:pic>
         <p:nvPicPr>
-          <p:cNvPr id="3074" name="Picture 2" descr="Image result for sqlite png"/>
+          <p:cNvPr id="11" name="Picture 10"/>
           <p:cNvPicPr>
-            <a:picLocks noChangeAspect="1" noChangeArrowheads="1"/>
+            <a:picLocks noChangeAspect="1"/>
           </p:cNvPicPr>
           <p:nvPr/>
         </p:nvPicPr>
         <p:blipFill>
           <a:blip r:embed="rId3">
-            <a:duotone>
-              <a:schemeClr val="accent1">
-                <a:shade val="45000"/>
-                <a:satMod val="135000"/>
-              </a:schemeClr>
-              <a:prstClr val="white"/>
-            </a:duotone>
             <a:extLst>
               <a:ext uri="{28A0092B-C50C-407E-A947-70E740481C1C}">
                 <a14:useLocalDpi xmlns:a14="http://schemas.microsoft.com/office/drawing/2010/main" val="0"/>
               </a:ext>
             </a:extLst>
           </a:blip>
-          <a:srcRect/>
           <a:stretch>
             <a:fillRect/>
           </a:stretch>
         </p:blipFill>
-        <p:spPr bwMode="auto">
-          <a:xfrm>
-            <a:off x="94392" y="1707797"/>
-            <a:ext cx="4447220" cy="2107797"/>
+        <p:spPr>
+          <a:xfrm>
+            <a:off x="6096000" y="692459"/>
+            <a:ext cx="5382376" cy="5468113"/>
           </a:xfrm>
           <a:prstGeom prst="rect">
             <a:avLst/>
           </a:prstGeom>
-          <a:noFill/>
-          <a:extLst>
-            <a:ext uri="{909E8E84-426E-40DD-AFC4-6F175D3DCCD1}">
-              <a14:hiddenFill xmlns:a14="http://schemas.microsoft.com/office/drawing/2010/main">
-                <a:solidFill>
-                  <a:srgbClr val="FFFFFF"/>
-                </a:solidFill>
-              </a14:hiddenFill>
-            </a:ext>
-          </a:extLst>
         </p:spPr>
       </p:pic>
     </p:spTree>
@@ -7176,7 +6894,7 @@
       </p:grpSpPr>
       <p:sp>
         <p:nvSpPr>
-          <p:cNvPr id="10" name="Rectangle 9"/>
+          <p:cNvPr id="12" name="Rectangle 11"/>
           <p:cNvSpPr>
             <a:spLocks noGrp="1" noRot="1" noChangeAspect="1" noMove="1" noResize="1" noEditPoints="1" noAdjustHandles="1" noChangeArrowheads="1" noChangeShapeType="1" noTextEdit="1"/>
           </p:cNvSpPr>
@@ -7207,7 +6925,7 @@
       </p:sp>
       <p:sp>
         <p:nvSpPr>
-          <p:cNvPr id="12" name="Rectangle 11"/>
+          <p:cNvPr id="14" name="Rectangle 13"/>
           <p:cNvSpPr>
             <a:spLocks noGrp="1" noRot="1" noChangeAspect="1" noMove="1" noResize="1" noEditPoints="1" noAdjustHandles="1" noChangeArrowheads="1" noChangeShapeType="1" noTextEdit="1"/>
           </p:cNvSpPr>
@@ -7266,6 +6984,38 @@
           </a:p>
         </p:txBody>
       </p:sp>
+      <p:pic>
+        <p:nvPicPr>
+          <p:cNvPr id="7" name="Picture Placeholder 6"/>
+          <p:cNvPicPr>
+            <a:picLocks noGrp="1" noChangeAspect="1"/>
+          </p:cNvPicPr>
+          <p:nvPr>
+            <p:ph type="pic" idx="1"/>
+          </p:nvPr>
+        </p:nvPicPr>
+        <p:blipFill rotWithShape="1">
+          <a:blip r:embed="rId2">
+            <a:extLst>
+              <a:ext uri="{28A0092B-C50C-407E-A947-70E740481C1C}">
+                <a14:useLocalDpi xmlns:a14="http://schemas.microsoft.com/office/drawing/2010/main" val="0"/>
+              </a:ext>
+            </a:extLst>
+          </a:blip>
+          <a:srcRect l="15005" r="16920"/>
+          <a:stretch/>
+        </p:blipFill>
+        <p:spPr>
+          <a:xfrm>
+            <a:off x="174271" y="2700337"/>
+            <a:ext cx="2054580" cy="1764029"/>
+          </a:xfrm>
+          <a:prstGeom prst="rect">
+            <a:avLst/>
+          </a:prstGeom>
+          <a:effectLst/>
+        </p:spPr>
+      </p:pic>
       <p:sp>
         <p:nvSpPr>
           <p:cNvPr id="2" name="Title 1"/>
@@ -7278,7 +7028,7 @@
         </p:nvSpPr>
         <p:spPr>
           <a:xfrm>
-            <a:off x="484484" y="31194"/>
+            <a:off x="1349016" y="-100118"/>
             <a:ext cx="3667039" cy="1676603"/>
           </a:xfrm>
         </p:spPr>
@@ -7288,7 +7038,6 @@
           </a:bodyPr>
           <a:lstStyle/>
           <a:p>
-            <a:pPr algn="ctr"/>
             <a:r>
               <a:rPr lang="en-US" sz="3600" b="1" dirty="0">
                 <a:solidFill>
@@ -7296,7 +7045,7 @@
                 </a:solidFill>
                 <a:latin typeface="Garamond" panose="02020404030301010803" pitchFamily="18" charset="0"/>
               </a:rPr>
-              <a:t>Online Framework</a:t>
+              <a:t>Testing</a:t>
             </a:r>
           </a:p>
         </p:txBody>
@@ -7313,7 +7062,7 @@
         </p:nvSpPr>
         <p:spPr>
           <a:xfrm>
-            <a:off x="484484" y="4517947"/>
+            <a:off x="484486" y="4464366"/>
             <a:ext cx="3667036" cy="3779520"/>
           </a:xfrm>
         </p:spPr>
@@ -7332,7 +7081,7 @@
                 <a:latin typeface="Batang" panose="02030600000101010101" pitchFamily="18" charset="-127"/>
                 <a:ea typeface="Batang" panose="02030600000101010101" pitchFamily="18" charset="-127"/>
               </a:rPr>
-              <a:t>Purpose:</a:t>
+              <a:t>Purpose: </a:t>
             </a:r>
           </a:p>
           <a:p>
@@ -7345,7 +7094,7 @@
                 <a:latin typeface="Batang" panose="02030600000101010101" pitchFamily="18" charset="-127"/>
                 <a:ea typeface="Batang" panose="02030600000101010101" pitchFamily="18" charset="-127"/>
               </a:rPr>
-              <a:t>To store information for events</a:t>
+              <a:t>Used these frameworks to develop unit tests for the code</a:t>
             </a:r>
           </a:p>
           <a:p>
@@ -7355,24 +7104,54 @@
                 <a:solidFill>
                   <a:srgbClr val="FF0000"/>
                 </a:solidFill>
-                <a:latin typeface="Batang" panose="02030600000101010101" pitchFamily="18" charset="-127"/>
+                <a:latin typeface="Garamond" panose="02020404030301010803" pitchFamily="18" charset="0"/>
                 <a:ea typeface="Batang" panose="02030600000101010101" pitchFamily="18" charset="-127"/>
               </a:rPr>
-              <a:t>4</a:t>
+              <a:t>5</a:t>
             </a:r>
           </a:p>
         </p:txBody>
       </p:sp>
       <p:pic>
         <p:nvPicPr>
-          <p:cNvPr id="1026" name="Picture 2" descr="Image result for heroku png"/>
+          <p:cNvPr id="9" name="Picture 8"/>
+          <p:cNvPicPr>
+            <a:picLocks noChangeAspect="1"/>
+          </p:cNvPicPr>
+          <p:nvPr/>
+        </p:nvPicPr>
+        <p:blipFill>
+          <a:blip r:embed="rId3">
+            <a:extLst>
+              <a:ext uri="{28A0092B-C50C-407E-A947-70E740481C1C}">
+                <a14:useLocalDpi xmlns:a14="http://schemas.microsoft.com/office/drawing/2010/main" val="0"/>
+              </a:ext>
+            </a:extLst>
+          </a:blip>
+          <a:stretch>
+            <a:fillRect/>
+          </a:stretch>
+        </p:blipFill>
+        <p:spPr>
+          <a:xfrm>
+            <a:off x="4673042" y="571101"/>
+            <a:ext cx="7087589" cy="5715798"/>
+          </a:xfrm>
+          <a:prstGeom prst="rect">
+            <a:avLst/>
+          </a:prstGeom>
+        </p:spPr>
+      </p:pic>
+      <p:pic>
+        <p:nvPicPr>
+          <p:cNvPr id="1026" name="Picture 2" descr="https://avatars1.githubusercontent.com/u/874086?v=3&amp;s=400"/>
           <p:cNvPicPr>
             <a:picLocks noChangeAspect="1" noChangeArrowheads="1"/>
           </p:cNvPicPr>
           <p:nvPr/>
         </p:nvPicPr>
         <p:blipFill>
-          <a:blip r:embed="rId2">
+          <a:blip r:embed="rId4">
             <a:extLst>
               <a:ext uri="{28A0092B-C50C-407E-A947-70E740481C1C}">
                 <a14:useLocalDpi xmlns:a14="http://schemas.microsoft.com/office/drawing/2010/main" val="0"/>
@@ -7386,8 +7165,8 @@
         </p:blipFill>
         <p:spPr bwMode="auto">
           <a:xfrm>
-            <a:off x="667522" y="3078480"/>
-            <a:ext cx="3300960" cy="1161866"/>
+            <a:off x="2185898" y="907807"/>
+            <a:ext cx="2274297" cy="2337667"/>
           </a:xfrm>
           <a:prstGeom prst="rect">
             <a:avLst/>
@@ -7404,75 +7183,10 @@
           </a:extLst>
         </p:spPr>
       </p:pic>
-      <p:pic>
-        <p:nvPicPr>
-          <p:cNvPr id="1028" name="Picture 4" descr="Image result for django png"/>
-          <p:cNvPicPr>
-            <a:picLocks noChangeAspect="1" noChangeArrowheads="1"/>
-          </p:cNvPicPr>
-          <p:nvPr/>
-        </p:nvPicPr>
-        <p:blipFill>
-          <a:blip r:embed="rId3">
-            <a:extLst>
-              <a:ext uri="{28A0092B-C50C-407E-A947-70E740481C1C}">
-                <a14:useLocalDpi xmlns:a14="http://schemas.microsoft.com/office/drawing/2010/main" val="0"/>
-              </a:ext>
-            </a:extLst>
-          </a:blip>
-          <a:srcRect/>
-          <a:stretch>
-            <a:fillRect/>
-          </a:stretch>
-        </p:blipFill>
-        <p:spPr bwMode="auto">
-          <a:xfrm>
-            <a:off x="1583920" y="1610315"/>
-            <a:ext cx="1468164" cy="1468164"/>
-          </a:xfrm>
-          <a:prstGeom prst="rect">
-            <a:avLst/>
-          </a:prstGeom>
-          <a:noFill/>
-          <a:extLst>
-            <a:ext uri="{909E8E84-426E-40DD-AFC4-6F175D3DCCD1}">
-              <a14:hiddenFill xmlns:a14="http://schemas.microsoft.com/office/drawing/2010/main">
-                <a:solidFill>
-                  <a:srgbClr val="FFFFFF"/>
-                </a:solidFill>
-              </a14:hiddenFill>
-            </a:ext>
-          </a:extLst>
-        </p:spPr>
-      </p:pic>
-      <p:pic>
-        <p:nvPicPr>
-          <p:cNvPr id="3" name="Picture 2"/>
-          <p:cNvPicPr>
-            <a:picLocks noChangeAspect="1"/>
-          </p:cNvPicPr>
-          <p:nvPr/>
-        </p:nvPicPr>
-        <p:blipFill>
-          <a:blip r:embed="rId4"/>
-          <a:stretch>
-            <a:fillRect/>
-          </a:stretch>
-        </p:blipFill>
-        <p:spPr>
-          <a:xfrm>
-            <a:off x="4633086" y="260850"/>
-            <a:ext cx="7561837" cy="6336299"/>
-          </a:xfrm>
-          <a:prstGeom prst="rect">
-            <a:avLst/>
-          </a:prstGeom>
-        </p:spPr>
-      </p:pic>
     </p:spTree>
     <p:extLst>
       <p:ext uri="{BB962C8B-B14F-4D97-AF65-F5344CB8AC3E}">
-        <p14:creationId xmlns:p14="http://schemas.microsoft.com/office/powerpoint/2010/main" val="3400475087"/>
+        <p14:creationId xmlns:p14="http://schemas.microsoft.com/office/powerpoint/2010/main" val="540850777"/>
       </p:ext>
     </p:extLst>
   </p:cSld>

</xml_diff>